<commit_message>
Fixing presentation for ORM
</commit_message>
<xml_diff>
--- a/Courses/Software-Sciences/Module-3-Databases-New/14-Connection-Between-C#-and-Database/12-Connection-Between-C#-and-Database.pptx
+++ b/Courses/Software-Sciences/Module-3-Databases-New/14-Connection-Between-C#-and-Database/12-Connection-Between-C#-and-Database.pptx
@@ -482,7 +482,7 @@
           <a:p>
             <a:fld id="{4E087215-0C8F-4762-A664-737A353EC9A4}" type="datetimeFigureOut">
               <a:rPr lang="bg-BG" smtClean="0"/>
-              <a:t>6.10.2023 г.</a:t>
+              <a:t>27.11.2023 г.</a:t>
             </a:fld>
             <a:endParaRPr lang="bg-BG"/>
           </a:p>
@@ -678,7 +678,7 @@
           <a:p>
             <a:fld id="{72D84649-876A-46C9-8472-14CB09C070D8}" type="datetimeFigureOut">
               <a:rPr lang="en-US" smtClean="0"/>
-              <a:t>10/6/2023</a:t>
+              <a:t>11/27/2023</a:t>
             </a:fld>
             <a:endParaRPr lang="en-US"/>
           </a:p>
@@ -12388,14 +12388,21 @@
         </p:blipFill>
         <p:spPr>
           <a:xfrm>
-            <a:off x="943974" y="2626226"/>
-            <a:ext cx="4070227" cy="3811500"/>
+            <a:off x="943974" y="2498123"/>
+            <a:ext cx="4207026" cy="3939603"/>
           </a:xfrm>
           <a:prstGeom prst="roundRect">
             <a:avLst>
               <a:gd name="adj" fmla="val 1465"/>
             </a:avLst>
           </a:prstGeom>
+          <a:ln>
+            <a:solidFill>
+              <a:schemeClr val="bg2">
+                <a:lumMod val="75000"/>
+              </a:schemeClr>
+            </a:solidFill>
+          </a:ln>
         </p:spPr>
       </p:pic>
       <p:pic>
@@ -12424,8 +12431,8 @@
         </p:blipFill>
         <p:spPr>
           <a:xfrm>
-            <a:off x="7877503" y="3069000"/>
-            <a:ext cx="2699550" cy="2849525"/>
+            <a:off x="7832503" y="2696975"/>
+            <a:ext cx="3123497" cy="3297025"/>
           </a:xfrm>
           <a:prstGeom prst="roundRect">
             <a:avLst>
@@ -12455,8 +12462,8 @@
         </p:nvSpPr>
         <p:spPr>
           <a:xfrm>
-            <a:off x="6140258" y="4222450"/>
-            <a:ext cx="611188" cy="619047"/>
+            <a:off x="6107080" y="4239000"/>
+            <a:ext cx="978920" cy="602499"/>
           </a:xfrm>
           <a:prstGeom prst="rightArrow">
             <a:avLst/>

</xml_diff>